<commit_message>
update final ppt of we 3
</commit_message>
<xml_diff>
--- a/512副本.pptx
+++ b/512副本.pptx
@@ -4802,34 +4802,7 @@
                 </a:solidFill>
                 <a:latin typeface="FFF Tusj" pitchFamily="18" charset="0"/>
               </a:rPr>
-              <a:t>Introdution </a:t>
-            </a:r>
-            <a:r>
-              <a:rPr lang="zh-CN" altLang="en-US" dirty="0" smtClean="0">
-                <a:solidFill>
-                  <a:schemeClr val="bg1"/>
-                </a:solidFill>
-                <a:latin typeface="FFF Tusj" pitchFamily="18" charset="0"/>
-              </a:rPr>
-              <a:t>（</a:t>
-            </a:r>
-            <a:r>
-              <a:rPr lang="en-US" altLang="zh-CN" dirty="0" smtClean="0">
-                <a:solidFill>
-                  <a:schemeClr val="bg1"/>
-                </a:solidFill>
-                <a:latin typeface="FFF Tusj" pitchFamily="18" charset="0"/>
-              </a:rPr>
-              <a:t>Cont..</a:t>
-            </a:r>
-            <a:r>
-              <a:rPr lang="zh-CN" altLang="en-US" dirty="0" smtClean="0">
-                <a:solidFill>
-                  <a:schemeClr val="bg1"/>
-                </a:solidFill>
-                <a:latin typeface="FFF Tusj" pitchFamily="18" charset="0"/>
-              </a:rPr>
-              <a:t>）</a:t>
+              <a:t>Introdution</a:t>
             </a:r>
             <a:endParaRPr lang="fr-CA" altLang="zh-CN" dirty="0" smtClean="0">
               <a:solidFill>
@@ -5468,34 +5441,25 @@
           <a:p>
             <a:pPr algn="l" eaLnBrk="1" hangingPunct="1"/>
             <a:r>
-              <a:rPr lang="fr-CA" altLang="zh-CN" smtClean="0">
+              <a:rPr lang="fr-CA" altLang="zh-CN" dirty="0" smtClean="0">
                 <a:solidFill>
                   <a:schemeClr val="bg1"/>
                 </a:solidFill>
                 <a:latin typeface="FFF Tusj" pitchFamily="18" charset="0"/>
               </a:rPr>
-              <a:t>Introdution </a:t>
-            </a:r>
-            <a:r>
-              <a:rPr lang="zh-CN" altLang="en-US" smtClean="0">
+              <a:t>Introdution(</a:t>
+            </a:r>
+            <a:r>
+              <a:rPr lang="en-US" altLang="zh-CN" dirty="0" smtClean="0">
                 <a:solidFill>
                   <a:schemeClr val="bg1"/>
                 </a:solidFill>
                 <a:latin typeface="FFF Tusj" pitchFamily="18" charset="0"/>
               </a:rPr>
-              <a:t>（</a:t>
-            </a:r>
-            <a:r>
-              <a:rPr lang="en-US" altLang="zh-CN" smtClean="0">
-                <a:solidFill>
-                  <a:schemeClr val="bg1"/>
-                </a:solidFill>
-                <a:latin typeface="FFF Tusj" pitchFamily="18" charset="0"/>
-              </a:rPr>
-              <a:t>Cont..</a:t>
-            </a:r>
-            <a:r>
-              <a:rPr lang="zh-CN" altLang="en-US" smtClean="0">
+              <a:t>Cont.</a:t>
+            </a:r>
+            <a:r>
+              <a:rPr lang="zh-CN" altLang="en-US" dirty="0" smtClean="0">
                 <a:solidFill>
                   <a:schemeClr val="bg1"/>
                 </a:solidFill>
@@ -5503,7 +5467,7 @@
               </a:rPr>
               <a:t>）</a:t>
             </a:r>
-            <a:endParaRPr lang="fr-CA" altLang="zh-CN" smtClean="0">
+            <a:endParaRPr lang="fr-CA" altLang="zh-CN" dirty="0" smtClean="0">
               <a:solidFill>
                 <a:schemeClr val="bg1"/>
               </a:solidFill>
@@ -5576,7 +5540,15 @@
                   <a:schemeClr val="bg1"/>
                 </a:solidFill>
               </a:rPr>
-              <a:t> Keep minute of life</a:t>
+              <a:t>Keep </a:t>
+            </a:r>
+            <a:r>
+              <a:rPr lang="fr-CA" altLang="zh-CN" sz="2800" dirty="0" smtClean="0">
+                <a:solidFill>
+                  <a:schemeClr val="bg1"/>
+                </a:solidFill>
+              </a:rPr>
+              <a:t>minute of life</a:t>
             </a:r>
           </a:p>
           <a:p>
@@ -5866,7 +5838,7 @@
                             </p:stCondLst>
                             <p:childTnLst>
                               <p:par>
-                                <p:cTn id="21" presetID="21" presetClass="entr" presetSubtype="1" fill="hold" grpId="0" nodeType="clickEffect">
+                                <p:cTn id="21" presetID="10" presetClass="entr" presetSubtype="0" fill="hold" grpId="0" nodeType="clickEffect">
                                   <p:stCondLst>
                                     <p:cond delay="0"/>
                                   </p:stCondLst>
@@ -5893,9 +5865,9 @@
                                         <p:strVal val="visible"/>
                                       </p:to>
                                     </p:set>
-                                    <p:animEffect transition="in" filter="wheel(1)">
-                                      <p:cBhvr>
-                                        <p:cTn id="23" dur="2000"/>
+                                    <p:animEffect transition="in" filter="fade">
+                                      <p:cBhvr>
+                                        <p:cTn id="23" dur="500"/>
                                         <p:tgtEl>
                                           <p:spTgt spid="3075">
                                             <p:txEl>
@@ -5936,7 +5908,7 @@
       </p:par>
     </p:tnLst>
     <p:bldLst>
-      <p:bldP spid="3075" grpId="0" build="p"/>
+      <p:bldP spid="3075" grpId="0" uiExpand="1" build="p"/>
     </p:bldLst>
   </p:timing>
 </p:sld>
@@ -5999,8 +5971,14 @@
                 </a:solidFill>
                 <a:latin typeface="FFF Tusj" pitchFamily="18" charset="0"/>
               </a:rPr>
-              <a:t>Functions(Cont...)</a:t>
-            </a:r>
+              <a:t>Functions</a:t>
+            </a:r>
+            <a:endParaRPr lang="fr-CA" altLang="zh-CN" dirty="0" smtClean="0">
+              <a:solidFill>
+                <a:schemeClr val="bg1"/>
+              </a:solidFill>
+              <a:latin typeface="FFF Tusj" pitchFamily="18" charset="0"/>
+            </a:endParaRPr>
           </a:p>
         </p:txBody>
       </p:sp>
@@ -6907,8 +6885,14 @@
                 </a:solidFill>
                 <a:latin typeface="FFF Tusj" pitchFamily="18" charset="0"/>
               </a:rPr>
-              <a:t>Functions(Cont...)</a:t>
-            </a:r>
+              <a:t>Functions(Cont.)</a:t>
+            </a:r>
+            <a:endParaRPr lang="fr-CA" altLang="zh-CN" dirty="0" smtClean="0">
+              <a:solidFill>
+                <a:schemeClr val="bg1"/>
+              </a:solidFill>
+              <a:latin typeface="FFF Tusj" pitchFamily="18" charset="0"/>
+            </a:endParaRPr>
           </a:p>
         </p:txBody>
       </p:sp>
@@ -14003,7 +13987,7 @@
         </p:nvSpPr>
         <p:spPr>
           <a:xfrm>
-            <a:off x="2528888" y="214313"/>
+            <a:off x="2521928" y="332656"/>
             <a:ext cx="6615112" cy="1143000"/>
           </a:xfrm>
         </p:spPr>
@@ -14064,7 +14048,7 @@
       </p:sp>
       <p:pic>
         <p:nvPicPr>
-          <p:cNvPr id="4" name="Picture 2"/>
+          <p:cNvPr id="5" name="Picture 8"/>
           <p:cNvPicPr>
             <a:picLocks noChangeAspect="1" noChangeArrowheads="1"/>
           </p:cNvPicPr>
@@ -14085,8 +14069,8 @@
         </p:blipFill>
         <p:spPr bwMode="auto">
           <a:xfrm>
-            <a:off x="2555778" y="3611017"/>
-            <a:ext cx="6297834" cy="2482279"/>
+            <a:off x="2528037" y="1556792"/>
+            <a:ext cx="6325575" cy="1957509"/>
           </a:xfrm>
           <a:prstGeom prst="rect">
             <a:avLst/>
@@ -14118,7 +14102,7 @@
       </p:pic>
       <p:pic>
         <p:nvPicPr>
-          <p:cNvPr id="5" name="Picture 8"/>
+          <p:cNvPr id="2052" name="Picture 4"/>
           <p:cNvPicPr>
             <a:picLocks noChangeAspect="1" noChangeArrowheads="1"/>
           </p:cNvPicPr>
@@ -14139,8 +14123,8 @@
         </p:blipFill>
         <p:spPr bwMode="auto">
           <a:xfrm>
-            <a:off x="2528037" y="1484784"/>
-            <a:ext cx="6325575" cy="1957509"/>
+            <a:off x="2513229" y="3861048"/>
+            <a:ext cx="6355190" cy="2016224"/>
           </a:xfrm>
           <a:prstGeom prst="rect">
             <a:avLst/>

</xml_diff>